<commit_message>
Updated PowerPoint, created before and after directories for step 3
</commit_message>
<xml_diff>
--- a/creating-powershell-modules.pptx
+++ b/creating-powershell-modules.pptx
@@ -6,8 +6,10 @@
   </p:sldMasterIdLst>
   <p:sldIdLst>
     <p:sldId id="256" r:id="rId2"/>
-    <p:sldId id="257" r:id="rId3"/>
-    <p:sldId id="258" r:id="rId4"/>
+    <p:sldId id="259" r:id="rId3"/>
+    <p:sldId id="260" r:id="rId4"/>
+    <p:sldId id="257" r:id="rId5"/>
+    <p:sldId id="258" r:id="rId6"/>
   </p:sldIdLst>
   <p:sldSz cx="12192000" cy="6858000"/>
   <p:notesSz cx="6858000" cy="9144000"/>
@@ -106,6 +108,11 @@
       </a:defRPr>
     </a:lvl9pPr>
   </p:defaultTextStyle>
+  <p:extLst>
+    <p:ext uri="{EFAFB233-063F-42B5-8137-9DF3F51BA10A}">
+      <p15:sldGuideLst xmlns:p15="http://schemas.microsoft.com/office/powerpoint/2012/main"/>
+    </p:ext>
+  </p:extLst>
 </p:presentation>
 </file>
 
@@ -256,7 +263,7 @@
           <a:p>
             <a:fld id="{C483F3B0-7496-431E-B091-87FE447172FB}" type="datetimeFigureOut">
               <a:rPr lang="en-US" smtClean="0"/>
-              <a:t>9/30/2019</a:t>
+              <a:t>10/2/2019</a:t>
             </a:fld>
             <a:endParaRPr lang="en-US"/>
           </a:p>
@@ -454,7 +461,7 @@
           <a:p>
             <a:fld id="{C483F3B0-7496-431E-B091-87FE447172FB}" type="datetimeFigureOut">
               <a:rPr lang="en-US" smtClean="0"/>
-              <a:t>9/30/2019</a:t>
+              <a:t>10/2/2019</a:t>
             </a:fld>
             <a:endParaRPr lang="en-US"/>
           </a:p>
@@ -662,7 +669,7 @@
           <a:p>
             <a:fld id="{C483F3B0-7496-431E-B091-87FE447172FB}" type="datetimeFigureOut">
               <a:rPr lang="en-US" smtClean="0"/>
-              <a:t>9/30/2019</a:t>
+              <a:t>10/2/2019</a:t>
             </a:fld>
             <a:endParaRPr lang="en-US"/>
           </a:p>
@@ -860,7 +867,7 @@
           <a:p>
             <a:fld id="{C483F3B0-7496-431E-B091-87FE447172FB}" type="datetimeFigureOut">
               <a:rPr lang="en-US" smtClean="0"/>
-              <a:t>9/30/2019</a:t>
+              <a:t>10/2/2019</a:t>
             </a:fld>
             <a:endParaRPr lang="en-US"/>
           </a:p>
@@ -1135,7 +1142,7 @@
           <a:p>
             <a:fld id="{C483F3B0-7496-431E-B091-87FE447172FB}" type="datetimeFigureOut">
               <a:rPr lang="en-US" smtClean="0"/>
-              <a:t>9/30/2019</a:t>
+              <a:t>10/2/2019</a:t>
             </a:fld>
             <a:endParaRPr lang="en-US"/>
           </a:p>
@@ -1400,7 +1407,7 @@
           <a:p>
             <a:fld id="{C483F3B0-7496-431E-B091-87FE447172FB}" type="datetimeFigureOut">
               <a:rPr lang="en-US" smtClean="0"/>
-              <a:t>9/30/2019</a:t>
+              <a:t>10/2/2019</a:t>
             </a:fld>
             <a:endParaRPr lang="en-US"/>
           </a:p>
@@ -1812,7 +1819,7 @@
           <a:p>
             <a:fld id="{C483F3B0-7496-431E-B091-87FE447172FB}" type="datetimeFigureOut">
               <a:rPr lang="en-US" smtClean="0"/>
-              <a:t>9/30/2019</a:t>
+              <a:t>10/2/2019</a:t>
             </a:fld>
             <a:endParaRPr lang="en-US"/>
           </a:p>
@@ -1953,7 +1960,7 @@
           <a:p>
             <a:fld id="{C483F3B0-7496-431E-B091-87FE447172FB}" type="datetimeFigureOut">
               <a:rPr lang="en-US" smtClean="0"/>
-              <a:t>9/30/2019</a:t>
+              <a:t>10/2/2019</a:t>
             </a:fld>
             <a:endParaRPr lang="en-US"/>
           </a:p>
@@ -2066,7 +2073,7 @@
           <a:p>
             <a:fld id="{C483F3B0-7496-431E-B091-87FE447172FB}" type="datetimeFigureOut">
               <a:rPr lang="en-US" smtClean="0"/>
-              <a:t>9/30/2019</a:t>
+              <a:t>10/2/2019</a:t>
             </a:fld>
             <a:endParaRPr lang="en-US"/>
           </a:p>
@@ -2377,7 +2384,7 @@
           <a:p>
             <a:fld id="{C483F3B0-7496-431E-B091-87FE447172FB}" type="datetimeFigureOut">
               <a:rPr lang="en-US" smtClean="0"/>
-              <a:t>9/30/2019</a:t>
+              <a:t>10/2/2019</a:t>
             </a:fld>
             <a:endParaRPr lang="en-US"/>
           </a:p>
@@ -2665,7 +2672,7 @@
           <a:p>
             <a:fld id="{C483F3B0-7496-431E-B091-87FE447172FB}" type="datetimeFigureOut">
               <a:rPr lang="en-US" smtClean="0"/>
-              <a:t>9/30/2019</a:t>
+              <a:t>10/2/2019</a:t>
             </a:fld>
             <a:endParaRPr lang="en-US"/>
           </a:p>
@@ -2906,7 +2913,7 @@
           <a:p>
             <a:fld id="{C483F3B0-7496-431E-B091-87FE447172FB}" type="datetimeFigureOut">
               <a:rPr lang="en-US" smtClean="0"/>
-              <a:t>9/30/2019</a:t>
+              <a:t>10/2/2019</a:t>
             </a:fld>
             <a:endParaRPr lang="en-US"/>
           </a:p>
@@ -3424,6 +3431,211 @@
           <p:cNvPr id="2" name="Title 1">
             <a:extLst>
               <a:ext uri="{FF2B5EF4-FFF2-40B4-BE49-F238E27FC236}">
+                <a16:creationId xmlns:a16="http://schemas.microsoft.com/office/drawing/2014/main" id="{53506329-F731-4C29-BF51-84E795B311D0}"/>
+              </a:ext>
+            </a:extLst>
+          </p:cNvPr>
+          <p:cNvSpPr>
+            <a:spLocks noGrp="1"/>
+          </p:cNvSpPr>
+          <p:nvPr>
+            <p:ph type="title"/>
+          </p:nvPr>
+        </p:nvSpPr>
+        <p:spPr/>
+        <p:txBody>
+          <a:bodyPr/>
+          <a:lstStyle/>
+          <a:p>
+            <a:r>
+              <a:rPr lang="nl-NL" dirty="0"/>
+              <a:t>Assumptions</a:t>
+            </a:r>
+          </a:p>
+        </p:txBody>
+      </p:sp>
+      <p:sp>
+        <p:nvSpPr>
+          <p:cNvPr id="3" name="Content Placeholder 2">
+            <a:extLst>
+              <a:ext uri="{FF2B5EF4-FFF2-40B4-BE49-F238E27FC236}">
+                <a16:creationId xmlns:a16="http://schemas.microsoft.com/office/drawing/2014/main" id="{3E5EB643-875B-47C7-B09C-600E96731815}"/>
+              </a:ext>
+            </a:extLst>
+          </p:cNvPr>
+          <p:cNvSpPr>
+            <a:spLocks noGrp="1"/>
+          </p:cNvSpPr>
+          <p:nvPr>
+            <p:ph idx="1"/>
+          </p:nvPr>
+        </p:nvSpPr>
+        <p:spPr/>
+        <p:txBody>
+          <a:bodyPr/>
+          <a:lstStyle/>
+          <a:p>
+            <a:r>
+              <a:rPr lang="nl-NL" dirty="0"/>
+              <a:t>We want our code to be easy to maintain</a:t>
+            </a:r>
+          </a:p>
+          <a:p>
+            <a:r>
+              <a:rPr lang="nl-NL" dirty="0"/>
+              <a:t>We want our code to be easy to read</a:t>
+            </a:r>
+          </a:p>
+          <a:p>
+            <a:r>
+              <a:rPr lang="nl-NL" dirty="0"/>
+              <a:t>We want our code to be easy to refactor or rework</a:t>
+            </a:r>
+          </a:p>
+          <a:p>
+            <a:r>
+              <a:rPr lang="nl-NL" dirty="0"/>
+              <a:t>We want to stimulate reusability of code</a:t>
+            </a:r>
+          </a:p>
+          <a:p>
+            <a:endParaRPr lang="nl-NL" dirty="0"/>
+          </a:p>
+        </p:txBody>
+      </p:sp>
+    </p:spTree>
+    <p:extLst>
+      <p:ext uri="{BB962C8B-B14F-4D97-AF65-F5344CB8AC3E}">
+        <p14:creationId xmlns:p14="http://schemas.microsoft.com/office/powerpoint/2010/main" val="2842092772"/>
+      </p:ext>
+    </p:extLst>
+  </p:cSld>
+  <p:clrMapOvr>
+    <a:masterClrMapping/>
+  </p:clrMapOvr>
+</p:sld>
+</file>
+
+<file path=ppt/slides/slide3.xml><?xml version="1.0" encoding="utf-8"?>
+<p:sld xmlns:a="http://schemas.openxmlformats.org/drawingml/2006/main" xmlns:r="http://schemas.openxmlformats.org/officeDocument/2006/relationships" xmlns:p="http://schemas.openxmlformats.org/presentationml/2006/main">
+  <p:cSld>
+    <p:spTree>
+      <p:nvGrpSpPr>
+        <p:cNvPr id="1" name=""/>
+        <p:cNvGrpSpPr/>
+        <p:nvPr/>
+      </p:nvGrpSpPr>
+      <p:grpSpPr>
+        <a:xfrm>
+          <a:off x="0" y="0"/>
+          <a:ext cx="0" cy="0"/>
+          <a:chOff x="0" y="0"/>
+          <a:chExt cx="0" cy="0"/>
+        </a:xfrm>
+      </p:grpSpPr>
+      <p:sp>
+        <p:nvSpPr>
+          <p:cNvPr id="2" name="Title 1">
+            <a:extLst>
+              <a:ext uri="{FF2B5EF4-FFF2-40B4-BE49-F238E27FC236}">
+                <a16:creationId xmlns:a16="http://schemas.microsoft.com/office/drawing/2014/main" id="{2767B8F8-3FB5-4180-AC9D-6C26DFDB7662}"/>
+              </a:ext>
+            </a:extLst>
+          </p:cNvPr>
+          <p:cNvSpPr>
+            <a:spLocks noGrp="1"/>
+          </p:cNvSpPr>
+          <p:nvPr>
+            <p:ph type="title"/>
+          </p:nvPr>
+        </p:nvSpPr>
+        <p:spPr/>
+        <p:txBody>
+          <a:bodyPr/>
+          <a:lstStyle/>
+          <a:p>
+            <a:r>
+              <a:rPr lang="nl-NL" dirty="0"/>
+              <a:t>Case	</a:t>
+            </a:r>
+          </a:p>
+        </p:txBody>
+      </p:sp>
+      <p:sp>
+        <p:nvSpPr>
+          <p:cNvPr id="3" name="Content Placeholder 2">
+            <a:extLst>
+              <a:ext uri="{FF2B5EF4-FFF2-40B4-BE49-F238E27FC236}">
+                <a16:creationId xmlns:a16="http://schemas.microsoft.com/office/drawing/2014/main" id="{52F41EF6-8A7B-4F4F-8CDC-5C238ADEF335}"/>
+              </a:ext>
+            </a:extLst>
+          </p:cNvPr>
+          <p:cNvSpPr>
+            <a:spLocks noGrp="1"/>
+          </p:cNvSpPr>
+          <p:nvPr>
+            <p:ph idx="1"/>
+          </p:nvPr>
+        </p:nvSpPr>
+        <p:spPr/>
+        <p:txBody>
+          <a:bodyPr/>
+          <a:lstStyle/>
+          <a:p>
+            <a:r>
+              <a:rPr lang="nl-NL" dirty="0"/>
+              <a:t>We’ve created a solution (repo 1) for a client that includes PowerShell scripts for deploying the solution.</a:t>
+            </a:r>
+          </a:p>
+          <a:p>
+            <a:r>
+              <a:rPr lang="nl-NL" dirty="0"/>
+              <a:t>The client asked us to create a second solution (repo 2) for them. </a:t>
+            </a:r>
+          </a:p>
+          <a:p>
+            <a:r>
+              <a:rPr lang="nl-NL" dirty="0"/>
+              <a:t>We want to reuse the PowerShell scripts in this second solution.</a:t>
+            </a:r>
+          </a:p>
+        </p:txBody>
+      </p:sp>
+    </p:spTree>
+    <p:extLst>
+      <p:ext uri="{BB962C8B-B14F-4D97-AF65-F5344CB8AC3E}">
+        <p14:creationId xmlns:p14="http://schemas.microsoft.com/office/powerpoint/2010/main" val="683837829"/>
+      </p:ext>
+    </p:extLst>
+  </p:cSld>
+  <p:clrMapOvr>
+    <a:masterClrMapping/>
+  </p:clrMapOvr>
+</p:sld>
+</file>
+
+<file path=ppt/slides/slide4.xml><?xml version="1.0" encoding="utf-8"?>
+<p:sld xmlns:a="http://schemas.openxmlformats.org/drawingml/2006/main" xmlns:r="http://schemas.openxmlformats.org/officeDocument/2006/relationships" xmlns:p="http://schemas.openxmlformats.org/presentationml/2006/main">
+  <p:cSld>
+    <p:spTree>
+      <p:nvGrpSpPr>
+        <p:cNvPr id="1" name=""/>
+        <p:cNvGrpSpPr/>
+        <p:nvPr/>
+      </p:nvGrpSpPr>
+      <p:grpSpPr>
+        <a:xfrm>
+          <a:off x="0" y="0"/>
+          <a:ext cx="0" cy="0"/>
+          <a:chOff x="0" y="0"/>
+          <a:chExt cx="0" cy="0"/>
+        </a:xfrm>
+      </p:grpSpPr>
+      <p:sp>
+        <p:nvSpPr>
+          <p:cNvPr id="2" name="Title 1">
+            <a:extLst>
+              <a:ext uri="{FF2B5EF4-FFF2-40B4-BE49-F238E27FC236}">
                 <a16:creationId xmlns:a16="http://schemas.microsoft.com/office/drawing/2014/main" id="{AA815FE2-FC7D-4722-89C1-2051A802487D}"/>
               </a:ext>
             </a:extLst>
@@ -3476,205 +3688,41 @@
           <a:p>
             <a:r>
               <a:rPr lang="nl-NL" dirty="0"/>
-              <a:t>Code </a:t>
-            </a:r>
-            <a:r>
-              <a:rPr lang="nl-NL" dirty="0" err="1"/>
-              <a:t>sharing</a:t>
-            </a:r>
+              <a:t>Code sharing across repos</a:t>
+            </a:r>
+          </a:p>
+          <a:p>
+            <a:pPr lvl="1"/>
             <a:r>
               <a:rPr lang="nl-NL" dirty="0"/>
-              <a:t> </a:t>
-            </a:r>
-            <a:r>
-              <a:rPr lang="nl-NL" dirty="0" err="1"/>
-              <a:t>within</a:t>
-            </a:r>
+              <a:t>Functions often get copied across, creating a hard-to-debug and hard-to-maintain landscape of repos</a:t>
+            </a:r>
+          </a:p>
+          <a:p>
+            <a:pPr lvl="1"/>
+            <a:endParaRPr lang="nl-NL" dirty="0"/>
+          </a:p>
+          <a:p>
             <a:r>
               <a:rPr lang="nl-NL" dirty="0"/>
-              <a:t> a large </a:t>
-            </a:r>
-            <a:r>
-              <a:rPr lang="nl-NL" dirty="0" err="1"/>
-              <a:t>repo</a:t>
-            </a:r>
-            <a:endParaRPr lang="nl-NL" dirty="0"/>
+              <a:t>Code sharing within a large repo</a:t>
+            </a:r>
           </a:p>
           <a:p>
             <a:pPr lvl="1"/>
             <a:r>
-              <a:rPr lang="nl-NL" dirty="0" err="1"/>
-              <a:t>Functions</a:t>
-            </a:r>
-            <a:r>
               <a:rPr lang="nl-NL" dirty="0"/>
-              <a:t> are </a:t>
-            </a:r>
-            <a:r>
-              <a:rPr lang="nl-NL" dirty="0" err="1"/>
-              <a:t>nice</a:t>
-            </a:r>
+              <a:t>Functions provide benefits, but complicate refactoring when using dot sourcing</a:t>
+            </a:r>
+          </a:p>
+          <a:p>
+            <a:pPr lvl="1"/>
             <a:r>
               <a:rPr lang="nl-NL" dirty="0"/>
-              <a:t>, but </a:t>
-            </a:r>
-            <a:r>
-              <a:rPr lang="nl-NL" dirty="0" err="1"/>
-              <a:t>complicate</a:t>
-            </a:r>
-            <a:r>
-              <a:rPr lang="nl-NL" dirty="0"/>
-              <a:t> </a:t>
-            </a:r>
-            <a:r>
-              <a:rPr lang="nl-NL" dirty="0" err="1"/>
-              <a:t>refactoring</a:t>
-            </a:r>
-            <a:endParaRPr lang="nl-NL" dirty="0"/>
-          </a:p>
-          <a:p>
-            <a:pPr lvl="1"/>
-            <a:r>
-              <a:rPr lang="nl-NL" dirty="0" err="1"/>
-              <a:t>Nobody</a:t>
-            </a:r>
-            <a:r>
-              <a:rPr lang="nl-NL" dirty="0"/>
-              <a:t> </a:t>
-            </a:r>
-            <a:r>
-              <a:rPr lang="nl-NL" dirty="0" err="1"/>
-              <a:t>likes</a:t>
-            </a:r>
-            <a:r>
-              <a:rPr lang="nl-NL" dirty="0"/>
-              <a:t> long </a:t>
-            </a:r>
-            <a:r>
-              <a:rPr lang="nl-NL" dirty="0" err="1"/>
-              <a:t>relative</a:t>
-            </a:r>
-            <a:r>
-              <a:rPr lang="nl-NL" dirty="0"/>
-              <a:t> </a:t>
-            </a:r>
-            <a:r>
-              <a:rPr lang="nl-NL" dirty="0" err="1"/>
-              <a:t>paths</a:t>
-            </a:r>
-            <a:endParaRPr lang="nl-NL" dirty="0"/>
-          </a:p>
-          <a:p>
-            <a:pPr marL="0" indent="0">
-              <a:buNone/>
-            </a:pPr>
-            <a:endParaRPr lang="nl-NL" dirty="0"/>
-          </a:p>
-          <a:p>
-            <a:r>
-              <a:rPr lang="nl-NL" dirty="0"/>
-              <a:t>Code </a:t>
-            </a:r>
-            <a:r>
-              <a:rPr lang="nl-NL" dirty="0" err="1"/>
-              <a:t>sharing</a:t>
-            </a:r>
-            <a:r>
-              <a:rPr lang="nl-NL" dirty="0"/>
-              <a:t> </a:t>
-            </a:r>
-            <a:r>
-              <a:rPr lang="nl-NL" dirty="0" err="1"/>
-              <a:t>across</a:t>
-            </a:r>
-            <a:r>
-              <a:rPr lang="nl-NL" dirty="0"/>
-              <a:t> </a:t>
-            </a:r>
-            <a:r>
-              <a:rPr lang="nl-NL" dirty="0" err="1"/>
-              <a:t>repos</a:t>
-            </a:r>
-            <a:endParaRPr lang="nl-NL" dirty="0"/>
-          </a:p>
-          <a:p>
-            <a:pPr lvl="1"/>
-            <a:r>
-              <a:rPr lang="nl-NL" dirty="0" err="1"/>
-              <a:t>Functions</a:t>
-            </a:r>
-            <a:r>
-              <a:rPr lang="nl-NL" dirty="0"/>
-              <a:t> </a:t>
-            </a:r>
-            <a:r>
-              <a:rPr lang="nl-NL" dirty="0" err="1"/>
-              <a:t>often</a:t>
-            </a:r>
-            <a:r>
-              <a:rPr lang="nl-NL" dirty="0"/>
-              <a:t> get </a:t>
-            </a:r>
-            <a:r>
-              <a:rPr lang="nl-NL" dirty="0" err="1"/>
-              <a:t>copied</a:t>
-            </a:r>
-            <a:r>
-              <a:rPr lang="nl-NL" dirty="0"/>
-              <a:t> </a:t>
-            </a:r>
-            <a:r>
-              <a:rPr lang="nl-NL" dirty="0" err="1"/>
-              <a:t>across</a:t>
-            </a:r>
-            <a:r>
-              <a:rPr lang="nl-NL" dirty="0"/>
-              <a:t>, </a:t>
-            </a:r>
-            <a:r>
-              <a:rPr lang="nl-NL" dirty="0" err="1"/>
-              <a:t>creating</a:t>
-            </a:r>
-            <a:r>
-              <a:rPr lang="nl-NL" dirty="0"/>
-              <a:t> a hard-</a:t>
-            </a:r>
-            <a:r>
-              <a:rPr lang="nl-NL" dirty="0" err="1"/>
-              <a:t>to</a:t>
-            </a:r>
-            <a:r>
-              <a:rPr lang="nl-NL" dirty="0"/>
-              <a:t>-debug </a:t>
-            </a:r>
-            <a:r>
-              <a:rPr lang="nl-NL" dirty="0" err="1"/>
-              <a:t>and</a:t>
-            </a:r>
-            <a:r>
-              <a:rPr lang="nl-NL" dirty="0"/>
-              <a:t> hard-</a:t>
-            </a:r>
-            <a:r>
-              <a:rPr lang="nl-NL" dirty="0" err="1"/>
-              <a:t>to</a:t>
-            </a:r>
-            <a:r>
-              <a:rPr lang="nl-NL" dirty="0"/>
-              <a:t>-</a:t>
-            </a:r>
-            <a:r>
-              <a:rPr lang="nl-NL" dirty="0" err="1"/>
-              <a:t>maintain</a:t>
-            </a:r>
-            <a:r>
-              <a:rPr lang="nl-NL" dirty="0"/>
-              <a:t> landscape of </a:t>
-            </a:r>
-            <a:r>
-              <a:rPr lang="nl-NL" dirty="0" err="1"/>
-              <a:t>repos</a:t>
-            </a:r>
+              <a:t>Nobody likes long relative paths when using dot sourcing</a:t>
+            </a:r>
+          </a:p>
+          <a:p>
             <a:endParaRPr lang="nl-NL" dirty="0"/>
           </a:p>
         </p:txBody>
@@ -3701,7 +3749,7 @@
         </p:blipFill>
         <p:spPr>
           <a:xfrm>
-            <a:off x="6690359" y="2517378"/>
+            <a:off x="6606597" y="3879851"/>
             <a:ext cx="3990975" cy="219075"/>
           </a:xfrm>
           <a:prstGeom prst="rect">
@@ -3730,7 +3778,7 @@
         </p:blipFill>
         <p:spPr>
           <a:xfrm>
-            <a:off x="6690359" y="4001294"/>
+            <a:off x="6606597" y="1825625"/>
             <a:ext cx="2459027" cy="1457325"/>
           </a:xfrm>
           <a:prstGeom prst="rect">
@@ -3760,7 +3808,7 @@
         </p:blipFill>
         <p:spPr>
           <a:xfrm>
-            <a:off x="9505560" y="4001294"/>
+            <a:off x="9421798" y="1825625"/>
             <a:ext cx="2352675" cy="1152525"/>
           </a:xfrm>
           <a:prstGeom prst="rect">
@@ -3782,7 +3830,7 @@
         </p:nvSpPr>
         <p:spPr>
           <a:xfrm>
-            <a:off x="7399020" y="4511040"/>
+            <a:off x="7315258" y="2335371"/>
             <a:ext cx="1424940" cy="198120"/>
           </a:xfrm>
           <a:prstGeom prst="rect">
@@ -3834,7 +3882,7 @@
         </p:nvSpPr>
         <p:spPr>
           <a:xfrm>
-            <a:off x="7399020" y="5028406"/>
+            <a:off x="7315258" y="2852737"/>
             <a:ext cx="1424940" cy="198120"/>
           </a:xfrm>
           <a:prstGeom prst="rect">
@@ -3886,7 +3934,7 @@
         </p:nvSpPr>
         <p:spPr>
           <a:xfrm>
-            <a:off x="10241280" y="4511040"/>
+            <a:off x="10157518" y="2335371"/>
             <a:ext cx="1424940" cy="198120"/>
           </a:xfrm>
           <a:prstGeom prst="rect">
@@ -3938,7 +3986,7 @@
         </p:nvSpPr>
         <p:spPr>
           <a:xfrm>
-            <a:off x="10241280" y="4709160"/>
+            <a:off x="10157518" y="2533491"/>
             <a:ext cx="1424940" cy="198120"/>
           </a:xfrm>
           <a:prstGeom prst="rect">
@@ -3989,7 +4037,7 @@
 </p:sld>
 </file>
 
-<file path=ppt/slides/slide3.xml><?xml version="1.0" encoding="utf-8"?>
+<file path=ppt/slides/slide5.xml><?xml version="1.0" encoding="utf-8"?>
 <p:sld xmlns:a="http://schemas.openxmlformats.org/drawingml/2006/main" xmlns:r="http://schemas.openxmlformats.org/officeDocument/2006/relationships" xmlns:p="http://schemas.openxmlformats.org/presentationml/2006/main">
   <p:cSld>
     <p:spTree>

</xml_diff>

<commit_message>
Added sources and publish module slides
</commit_message>
<xml_diff>
--- a/creating-powershell-modules.pptx
+++ b/creating-powershell-modules.pptx
@@ -10,6 +10,9 @@
     <p:sldId id="260" r:id="rId4"/>
     <p:sldId id="257" r:id="rId5"/>
     <p:sldId id="258" r:id="rId6"/>
+    <p:sldId id="262" r:id="rId7"/>
+    <p:sldId id="263" r:id="rId8"/>
+    <p:sldId id="261" r:id="rId9"/>
   </p:sldIdLst>
   <p:sldSz cx="12192000" cy="6858000"/>
   <p:notesSz cx="6858000" cy="9144000"/>
@@ -4196,6 +4199,356 @@
 </p:sld>
 </file>
 
+<file path=ppt/slides/slide6.xml><?xml version="1.0" encoding="utf-8"?>
+<p:sld xmlns:a="http://schemas.openxmlformats.org/drawingml/2006/main" xmlns:r="http://schemas.openxmlformats.org/officeDocument/2006/relationships" xmlns:p="http://schemas.openxmlformats.org/presentationml/2006/main">
+  <p:cSld>
+    <p:spTree>
+      <p:nvGrpSpPr>
+        <p:cNvPr id="1" name=""/>
+        <p:cNvGrpSpPr/>
+        <p:nvPr/>
+      </p:nvGrpSpPr>
+      <p:grpSpPr>
+        <a:xfrm>
+          <a:off x="0" y="0"/>
+          <a:ext cx="0" cy="0"/>
+          <a:chOff x="0" y="0"/>
+          <a:chExt cx="0" cy="0"/>
+        </a:xfrm>
+      </p:grpSpPr>
+      <p:sp>
+        <p:nvSpPr>
+          <p:cNvPr id="2" name="Title 1">
+            <a:extLst>
+              <a:ext uri="{FF2B5EF4-FFF2-40B4-BE49-F238E27FC236}">
+                <a16:creationId xmlns:a16="http://schemas.microsoft.com/office/drawing/2014/main" id="{6850DB78-8ADF-4626-A5D4-75D989C08C62}"/>
+              </a:ext>
+            </a:extLst>
+          </p:cNvPr>
+          <p:cNvSpPr>
+            <a:spLocks noGrp="1"/>
+          </p:cNvSpPr>
+          <p:nvPr>
+            <p:ph type="title"/>
+          </p:nvPr>
+        </p:nvSpPr>
+        <p:spPr/>
+        <p:txBody>
+          <a:bodyPr/>
+          <a:lstStyle/>
+          <a:p>
+            <a:r>
+              <a:rPr lang="nl-NL" dirty="0"/>
+              <a:t>Demo</a:t>
+            </a:r>
+          </a:p>
+        </p:txBody>
+      </p:sp>
+      <p:sp>
+        <p:nvSpPr>
+          <p:cNvPr id="3" name="Content Placeholder 2">
+            <a:extLst>
+              <a:ext uri="{FF2B5EF4-FFF2-40B4-BE49-F238E27FC236}">
+                <a16:creationId xmlns:a16="http://schemas.microsoft.com/office/drawing/2014/main" id="{CA5AD246-CC17-441E-9698-393AF0FD38EB}"/>
+              </a:ext>
+            </a:extLst>
+          </p:cNvPr>
+          <p:cNvSpPr>
+            <a:spLocks noGrp="1"/>
+          </p:cNvSpPr>
+          <p:nvPr>
+            <p:ph idx="1"/>
+          </p:nvPr>
+        </p:nvSpPr>
+        <p:spPr/>
+        <p:txBody>
+          <a:bodyPr/>
+          <a:lstStyle/>
+          <a:p>
+            <a:endParaRPr lang="nl-NL"/>
+          </a:p>
+        </p:txBody>
+      </p:sp>
+    </p:spTree>
+    <p:extLst>
+      <p:ext uri="{BB962C8B-B14F-4D97-AF65-F5344CB8AC3E}">
+        <p14:creationId xmlns:p14="http://schemas.microsoft.com/office/powerpoint/2010/main" val="234113039"/>
+      </p:ext>
+    </p:extLst>
+  </p:cSld>
+  <p:clrMapOvr>
+    <a:masterClrMapping/>
+  </p:clrMapOvr>
+</p:sld>
+</file>
+
+<file path=ppt/slides/slide7.xml><?xml version="1.0" encoding="utf-8"?>
+<p:sld xmlns:a="http://schemas.openxmlformats.org/drawingml/2006/main" xmlns:r="http://schemas.openxmlformats.org/officeDocument/2006/relationships" xmlns:p="http://schemas.openxmlformats.org/presentationml/2006/main">
+  <p:cSld>
+    <p:spTree>
+      <p:nvGrpSpPr>
+        <p:cNvPr id="1" name=""/>
+        <p:cNvGrpSpPr/>
+        <p:nvPr/>
+      </p:nvGrpSpPr>
+      <p:grpSpPr>
+        <a:xfrm>
+          <a:off x="0" y="0"/>
+          <a:ext cx="0" cy="0"/>
+          <a:chOff x="0" y="0"/>
+          <a:chExt cx="0" cy="0"/>
+        </a:xfrm>
+      </p:grpSpPr>
+      <p:sp>
+        <p:nvSpPr>
+          <p:cNvPr id="2" name="Title 1">
+            <a:extLst>
+              <a:ext uri="{FF2B5EF4-FFF2-40B4-BE49-F238E27FC236}">
+                <a16:creationId xmlns:a16="http://schemas.microsoft.com/office/drawing/2014/main" id="{72E21655-B0AC-45CB-94D3-6D8E094CF430}"/>
+              </a:ext>
+            </a:extLst>
+          </p:cNvPr>
+          <p:cNvSpPr>
+            <a:spLocks noGrp="1"/>
+          </p:cNvSpPr>
+          <p:nvPr>
+            <p:ph type="title"/>
+          </p:nvPr>
+        </p:nvSpPr>
+        <p:spPr/>
+        <p:txBody>
+          <a:bodyPr/>
+          <a:lstStyle/>
+          <a:p>
+            <a:r>
+              <a:rPr lang="nl-NL" dirty="0"/>
+              <a:t>Publish your module to the web</a:t>
+            </a:r>
+          </a:p>
+        </p:txBody>
+      </p:sp>
+      <p:sp>
+        <p:nvSpPr>
+          <p:cNvPr id="3" name="Content Placeholder 2">
+            <a:extLst>
+              <a:ext uri="{FF2B5EF4-FFF2-40B4-BE49-F238E27FC236}">
+                <a16:creationId xmlns:a16="http://schemas.microsoft.com/office/drawing/2014/main" id="{4F5EA845-30C8-42D6-883F-DA5B108067B0}"/>
+              </a:ext>
+            </a:extLst>
+          </p:cNvPr>
+          <p:cNvSpPr>
+            <a:spLocks noGrp="1"/>
+          </p:cNvSpPr>
+          <p:nvPr>
+            <p:ph idx="1"/>
+          </p:nvPr>
+        </p:nvSpPr>
+        <p:spPr/>
+        <p:txBody>
+          <a:bodyPr/>
+          <a:lstStyle/>
+          <a:p>
+            <a:pPr marL="0" indent="0">
+              <a:buNone/>
+            </a:pPr>
+            <a:r>
+              <a:rPr lang="nl-NL" dirty="0"/>
+              <a:t>Easy but public</a:t>
+            </a:r>
+          </a:p>
+          <a:p>
+            <a:r>
+              <a:rPr lang="nl-NL" dirty="0"/>
+              <a:t>Publish your module to the PowerShell Gallery </a:t>
+            </a:r>
+          </a:p>
+          <a:p>
+            <a:endParaRPr lang="nl-NL" dirty="0"/>
+          </a:p>
+          <a:p>
+            <a:pPr marL="0" indent="0">
+              <a:buNone/>
+            </a:pPr>
+            <a:r>
+              <a:rPr lang="nl-NL" dirty="0"/>
+              <a:t>More effort but private</a:t>
+            </a:r>
+          </a:p>
+          <a:p>
+            <a:r>
+              <a:rPr lang="nl-NL" dirty="0"/>
+              <a:t>Host your PowerShell module on a private hosting platform (artifactory, Azure DevOps Artifact, file share etc)</a:t>
+            </a:r>
+          </a:p>
+          <a:p>
+            <a:r>
+              <a:rPr lang="nl-NL" dirty="0"/>
+              <a:t>Register the hosting platform as a PSRepository</a:t>
+            </a:r>
+          </a:p>
+          <a:p>
+            <a:pPr marL="0" indent="0">
+              <a:buNone/>
+            </a:pPr>
+            <a:endParaRPr lang="nl-NL" dirty="0"/>
+          </a:p>
+          <a:p>
+            <a:endParaRPr lang="nl-NL" dirty="0"/>
+          </a:p>
+        </p:txBody>
+      </p:sp>
+    </p:spTree>
+    <p:extLst>
+      <p:ext uri="{BB962C8B-B14F-4D97-AF65-F5344CB8AC3E}">
+        <p14:creationId xmlns:p14="http://schemas.microsoft.com/office/powerpoint/2010/main" val="158173024"/>
+      </p:ext>
+    </p:extLst>
+  </p:cSld>
+  <p:clrMapOvr>
+    <a:masterClrMapping/>
+  </p:clrMapOvr>
+</p:sld>
+</file>
+
+<file path=ppt/slides/slide8.xml><?xml version="1.0" encoding="utf-8"?>
+<p:sld xmlns:a="http://schemas.openxmlformats.org/drawingml/2006/main" xmlns:r="http://schemas.openxmlformats.org/officeDocument/2006/relationships" xmlns:p="http://schemas.openxmlformats.org/presentationml/2006/main">
+  <p:cSld>
+    <p:spTree>
+      <p:nvGrpSpPr>
+        <p:cNvPr id="1" name=""/>
+        <p:cNvGrpSpPr/>
+        <p:nvPr/>
+      </p:nvGrpSpPr>
+      <p:grpSpPr>
+        <a:xfrm>
+          <a:off x="0" y="0"/>
+          <a:ext cx="0" cy="0"/>
+          <a:chOff x="0" y="0"/>
+          <a:chExt cx="0" cy="0"/>
+        </a:xfrm>
+      </p:grpSpPr>
+      <p:sp>
+        <p:nvSpPr>
+          <p:cNvPr id="2" name="Title 1">
+            <a:extLst>
+              <a:ext uri="{FF2B5EF4-FFF2-40B4-BE49-F238E27FC236}">
+                <a16:creationId xmlns:a16="http://schemas.microsoft.com/office/drawing/2014/main" id="{9E81C091-5492-4E4E-A5C2-434DEA0CB51B}"/>
+              </a:ext>
+            </a:extLst>
+          </p:cNvPr>
+          <p:cNvSpPr>
+            <a:spLocks noGrp="1"/>
+          </p:cNvSpPr>
+          <p:nvPr>
+            <p:ph type="title"/>
+          </p:nvPr>
+        </p:nvSpPr>
+        <p:spPr/>
+        <p:txBody>
+          <a:bodyPr/>
+          <a:lstStyle/>
+          <a:p>
+            <a:r>
+              <a:rPr lang="nl-NL" dirty="0"/>
+              <a:t>Materials</a:t>
+            </a:r>
+          </a:p>
+        </p:txBody>
+      </p:sp>
+      <p:sp>
+        <p:nvSpPr>
+          <p:cNvPr id="3" name="Content Placeholder 2">
+            <a:extLst>
+              <a:ext uri="{FF2B5EF4-FFF2-40B4-BE49-F238E27FC236}">
+                <a16:creationId xmlns:a16="http://schemas.microsoft.com/office/drawing/2014/main" id="{2CAFB903-6519-47A2-B323-C94F19B5602C}"/>
+              </a:ext>
+            </a:extLst>
+          </p:cNvPr>
+          <p:cNvSpPr>
+            <a:spLocks noGrp="1"/>
+          </p:cNvSpPr>
+          <p:nvPr>
+            <p:ph idx="1"/>
+          </p:nvPr>
+        </p:nvSpPr>
+        <p:spPr/>
+        <p:txBody>
+          <a:bodyPr/>
+          <a:lstStyle/>
+          <a:p>
+            <a:pPr marL="0" indent="0">
+              <a:buNone/>
+            </a:pPr>
+            <a:r>
+              <a:rPr lang="nl-NL" dirty="0"/>
+              <a:t>Scripts and presentation</a:t>
+            </a:r>
+          </a:p>
+          <a:p>
+            <a:r>
+              <a:rPr lang="nl-NL" dirty="0">
+                <a:hlinkClick r:id="rId2"/>
+              </a:rPr>
+              <a:t>GitHub</a:t>
+            </a:r>
+            <a:endParaRPr lang="nl-NL" dirty="0"/>
+          </a:p>
+          <a:p>
+            <a:endParaRPr lang="nl-NL" dirty="0"/>
+          </a:p>
+          <a:p>
+            <a:pPr marL="0" indent="0">
+              <a:buNone/>
+            </a:pPr>
+            <a:r>
+              <a:rPr lang="nl-NL" dirty="0"/>
+              <a:t>Sources</a:t>
+            </a:r>
+          </a:p>
+          <a:p>
+            <a:r>
+              <a:rPr lang="nl-NL" dirty="0">
+                <a:hlinkClick r:id="rId3"/>
+              </a:rPr>
+              <a:t>PowerShell on docs.microsoft.com</a:t>
+            </a:r>
+            <a:endParaRPr lang="nl-NL" dirty="0">
+              <a:hlinkClick r:id="rId4"/>
+            </a:endParaRPr>
+          </a:p>
+          <a:p>
+            <a:r>
+              <a:rPr lang="nl-NL" dirty="0">
+                <a:hlinkClick r:id="rId4"/>
+              </a:rPr>
+              <a:t>PowerShellExplained.com</a:t>
+            </a:r>
+            <a:endParaRPr lang="nl-NL" dirty="0"/>
+          </a:p>
+          <a:p>
+            <a:r>
+              <a:rPr lang="nl-NL" dirty="0">
+                <a:hlinkClick r:id="rId5"/>
+              </a:rPr>
+              <a:t>SimpleTalk.com</a:t>
+            </a:r>
+            <a:endParaRPr lang="nl-NL" dirty="0"/>
+          </a:p>
+        </p:txBody>
+      </p:sp>
+    </p:spTree>
+    <p:extLst>
+      <p:ext uri="{BB962C8B-B14F-4D97-AF65-F5344CB8AC3E}">
+        <p14:creationId xmlns:p14="http://schemas.microsoft.com/office/powerpoint/2010/main" val="1123404240"/>
+      </p:ext>
+    </p:extLst>
+  </p:cSld>
+  <p:clrMapOvr>
+    <a:masterClrMapping/>
+  </p:clrMapOvr>
+</p:sld>
+</file>
+
 <file path=ppt/theme/theme1.xml><?xml version="1.0" encoding="utf-8"?>
 <a:theme xmlns:a="http://schemas.openxmlformats.org/drawingml/2006/main" name="Office Theme">
   <a:themeElements>

</xml_diff>

<commit_message>
Added summary to the PowerPoint presentation
</commit_message>
<xml_diff>
--- a/creating-powershell-modules.pptx
+++ b/creating-powershell-modules.pptx
@@ -12,7 +12,8 @@
     <p:sldId id="258" r:id="rId6"/>
     <p:sldId id="262" r:id="rId7"/>
     <p:sldId id="263" r:id="rId8"/>
-    <p:sldId id="261" r:id="rId9"/>
+    <p:sldId id="264" r:id="rId9"/>
+    <p:sldId id="261" r:id="rId10"/>
   </p:sldIdLst>
   <p:sldSz cx="12192000" cy="6858000"/>
   <p:notesSz cx="6858000" cy="9144000"/>
@@ -266,7 +267,7 @@
           <a:p>
             <a:fld id="{C483F3B0-7496-431E-B091-87FE447172FB}" type="datetimeFigureOut">
               <a:rPr lang="en-US" smtClean="0"/>
-              <a:t>10/2/2019</a:t>
+              <a:t>10/3/2019</a:t>
             </a:fld>
             <a:endParaRPr lang="en-US"/>
           </a:p>
@@ -464,7 +465,7 @@
           <a:p>
             <a:fld id="{C483F3B0-7496-431E-B091-87FE447172FB}" type="datetimeFigureOut">
               <a:rPr lang="en-US" smtClean="0"/>
-              <a:t>10/2/2019</a:t>
+              <a:t>10/3/2019</a:t>
             </a:fld>
             <a:endParaRPr lang="en-US"/>
           </a:p>
@@ -672,7 +673,7 @@
           <a:p>
             <a:fld id="{C483F3B0-7496-431E-B091-87FE447172FB}" type="datetimeFigureOut">
               <a:rPr lang="en-US" smtClean="0"/>
-              <a:t>10/2/2019</a:t>
+              <a:t>10/3/2019</a:t>
             </a:fld>
             <a:endParaRPr lang="en-US"/>
           </a:p>
@@ -870,7 +871,7 @@
           <a:p>
             <a:fld id="{C483F3B0-7496-431E-B091-87FE447172FB}" type="datetimeFigureOut">
               <a:rPr lang="en-US" smtClean="0"/>
-              <a:t>10/2/2019</a:t>
+              <a:t>10/3/2019</a:t>
             </a:fld>
             <a:endParaRPr lang="en-US"/>
           </a:p>
@@ -1145,7 +1146,7 @@
           <a:p>
             <a:fld id="{C483F3B0-7496-431E-B091-87FE447172FB}" type="datetimeFigureOut">
               <a:rPr lang="en-US" smtClean="0"/>
-              <a:t>10/2/2019</a:t>
+              <a:t>10/3/2019</a:t>
             </a:fld>
             <a:endParaRPr lang="en-US"/>
           </a:p>
@@ -1410,7 +1411,7 @@
           <a:p>
             <a:fld id="{C483F3B0-7496-431E-B091-87FE447172FB}" type="datetimeFigureOut">
               <a:rPr lang="en-US" smtClean="0"/>
-              <a:t>10/2/2019</a:t>
+              <a:t>10/3/2019</a:t>
             </a:fld>
             <a:endParaRPr lang="en-US"/>
           </a:p>
@@ -1822,7 +1823,7 @@
           <a:p>
             <a:fld id="{C483F3B0-7496-431E-B091-87FE447172FB}" type="datetimeFigureOut">
               <a:rPr lang="en-US" smtClean="0"/>
-              <a:t>10/2/2019</a:t>
+              <a:t>10/3/2019</a:t>
             </a:fld>
             <a:endParaRPr lang="en-US"/>
           </a:p>
@@ -1963,7 +1964,7 @@
           <a:p>
             <a:fld id="{C483F3B0-7496-431E-B091-87FE447172FB}" type="datetimeFigureOut">
               <a:rPr lang="en-US" smtClean="0"/>
-              <a:t>10/2/2019</a:t>
+              <a:t>10/3/2019</a:t>
             </a:fld>
             <a:endParaRPr lang="en-US"/>
           </a:p>
@@ -2076,7 +2077,7 @@
           <a:p>
             <a:fld id="{C483F3B0-7496-431E-B091-87FE447172FB}" type="datetimeFigureOut">
               <a:rPr lang="en-US" smtClean="0"/>
-              <a:t>10/2/2019</a:t>
+              <a:t>10/3/2019</a:t>
             </a:fld>
             <a:endParaRPr lang="en-US"/>
           </a:p>
@@ -2387,7 +2388,7 @@
           <a:p>
             <a:fld id="{C483F3B0-7496-431E-B091-87FE447172FB}" type="datetimeFigureOut">
               <a:rPr lang="en-US" smtClean="0"/>
-              <a:t>10/2/2019</a:t>
+              <a:t>10/3/2019</a:t>
             </a:fld>
             <a:endParaRPr lang="en-US"/>
           </a:p>
@@ -2675,7 +2676,7 @@
           <a:p>
             <a:fld id="{C483F3B0-7496-431E-B091-87FE447172FB}" type="datetimeFigureOut">
               <a:rPr lang="en-US" smtClean="0"/>
-              <a:t>10/2/2019</a:t>
+              <a:t>10/3/2019</a:t>
             </a:fld>
             <a:endParaRPr lang="en-US"/>
           </a:p>
@@ -2916,7 +2917,7 @@
           <a:p>
             <a:fld id="{C483F3B0-7496-431E-B091-87FE447172FB}" type="datetimeFigureOut">
               <a:rPr lang="en-US" smtClean="0"/>
-              <a:t>10/2/2019</a:t>
+              <a:t>10/3/2019</a:t>
             </a:fld>
             <a:endParaRPr lang="en-US"/>
           </a:p>
@@ -4695,7 +4696,7 @@
           <a:p>
             <a:r>
               <a:rPr lang="nl-NL" dirty="0"/>
-              <a:t>Host your PowerShell module on a private hosting platform (artifactory, Azure DevOps Artifact, file share etc)</a:t>
+              <a:t>Host your PowerShell module on a private hosting platform (artifactory, file share etc)</a:t>
             </a:r>
           </a:p>
           <a:p>
@@ -4729,6 +4730,127 @@
 </file>
 
 <file path=ppt/slides/slide8.xml><?xml version="1.0" encoding="utf-8"?>
+<p:sld xmlns:a="http://schemas.openxmlformats.org/drawingml/2006/main" xmlns:r="http://schemas.openxmlformats.org/officeDocument/2006/relationships" xmlns:p="http://schemas.openxmlformats.org/presentationml/2006/main">
+  <p:cSld>
+    <p:spTree>
+      <p:nvGrpSpPr>
+        <p:cNvPr id="1" name=""/>
+        <p:cNvGrpSpPr/>
+        <p:nvPr/>
+      </p:nvGrpSpPr>
+      <p:grpSpPr>
+        <a:xfrm>
+          <a:off x="0" y="0"/>
+          <a:ext cx="0" cy="0"/>
+          <a:chOff x="0" y="0"/>
+          <a:chExt cx="0" cy="0"/>
+        </a:xfrm>
+      </p:grpSpPr>
+      <p:sp>
+        <p:nvSpPr>
+          <p:cNvPr id="2" name="Title 1">
+            <a:extLst>
+              <a:ext uri="{FF2B5EF4-FFF2-40B4-BE49-F238E27FC236}">
+                <a16:creationId xmlns:a16="http://schemas.microsoft.com/office/drawing/2014/main" id="{BD6C736D-8D2C-45ED-848C-CF09870A3CF8}"/>
+              </a:ext>
+            </a:extLst>
+          </p:cNvPr>
+          <p:cNvSpPr>
+            <a:spLocks noGrp="1"/>
+          </p:cNvSpPr>
+          <p:nvPr>
+            <p:ph type="title"/>
+          </p:nvPr>
+        </p:nvSpPr>
+        <p:spPr/>
+        <p:txBody>
+          <a:bodyPr/>
+          <a:lstStyle/>
+          <a:p>
+            <a:r>
+              <a:rPr lang="nl-NL" dirty="0"/>
+              <a:t>Summarize</a:t>
+            </a:r>
+          </a:p>
+        </p:txBody>
+      </p:sp>
+      <p:sp>
+        <p:nvSpPr>
+          <p:cNvPr id="3" name="Content Placeholder 2">
+            <a:extLst>
+              <a:ext uri="{FF2B5EF4-FFF2-40B4-BE49-F238E27FC236}">
+                <a16:creationId xmlns:a16="http://schemas.microsoft.com/office/drawing/2014/main" id="{69EF4012-E6DA-4AE5-A417-094409429F24}"/>
+              </a:ext>
+            </a:extLst>
+          </p:cNvPr>
+          <p:cNvSpPr>
+            <a:spLocks noGrp="1"/>
+          </p:cNvSpPr>
+          <p:nvPr>
+            <p:ph idx="1"/>
+          </p:nvPr>
+        </p:nvSpPr>
+        <p:spPr/>
+        <p:txBody>
+          <a:bodyPr/>
+          <a:lstStyle/>
+          <a:p>
+            <a:r>
+              <a:rPr lang="nl-NL" dirty="0"/>
+              <a:t>Isolate your functions in a .psm1 file</a:t>
+            </a:r>
+          </a:p>
+          <a:p>
+            <a:r>
+              <a:rPr lang="nl-NL" dirty="0"/>
+              <a:t>Create a module </a:t>
+            </a:r>
+            <a:r>
+              <a:rPr lang="nl-NL"/>
+              <a:t>manifest (.psd1) using </a:t>
+            </a:r>
+            <a:r>
+              <a:rPr lang="nl-NL" dirty="0"/>
+              <a:t>New-ModuleManifest</a:t>
+            </a:r>
+          </a:p>
+          <a:p>
+            <a:r>
+              <a:rPr lang="nl-NL" dirty="0"/>
+              <a:t>Place your module in a folder indicated by $Env:PSModulePath</a:t>
+            </a:r>
+          </a:p>
+          <a:p>
+            <a:pPr marL="0" indent="0">
+              <a:buNone/>
+            </a:pPr>
+            <a:r>
+              <a:rPr lang="nl-NL" dirty="0"/>
+              <a:t>	OR</a:t>
+            </a:r>
+          </a:p>
+          <a:p>
+            <a:r>
+              <a:rPr lang="nl-NL" dirty="0"/>
+              <a:t>Publish your module to a public or private repository</a:t>
+            </a:r>
+          </a:p>
+        </p:txBody>
+      </p:sp>
+    </p:spTree>
+    <p:extLst>
+      <p:ext uri="{BB962C8B-B14F-4D97-AF65-F5344CB8AC3E}">
+        <p14:creationId xmlns:p14="http://schemas.microsoft.com/office/powerpoint/2010/main" val="1536126677"/>
+      </p:ext>
+    </p:extLst>
+  </p:cSld>
+  <p:clrMapOvr>
+    <a:masterClrMapping/>
+  </p:clrMapOvr>
+</p:sld>
+</file>
+
+<file path=ppt/slides/slide9.xml><?xml version="1.0" encoding="utf-8"?>
 <p:sld xmlns:a="http://schemas.openxmlformats.org/drawingml/2006/main" xmlns:r="http://schemas.openxmlformats.org/officeDocument/2006/relationships" xmlns:p="http://schemas.openxmlformats.org/presentationml/2006/main">
   <p:cSld>
     <p:spTree>

</xml_diff>